<commit_message>
Add MS Band Code
</commit_message>
<xml_diff>
--- a/Presentation FIles/UWP - Beyond Build.pptx
+++ b/Presentation FIles/UWP - Beyond Build.pptx
@@ -5,7 +5,7 @@
     <p:sldMasterId id="2147483648" r:id="rId1"/>
   </p:sldMasterIdLst>
   <p:notesMasterIdLst>
-    <p:notesMasterId r:id="rId10"/>
+    <p:notesMasterId r:id="rId11"/>
   </p:notesMasterIdLst>
   <p:sldIdLst>
     <p:sldId id="256" r:id="rId2"/>
@@ -13,9 +13,10 @@
     <p:sldId id="257" r:id="rId4"/>
     <p:sldId id="259" r:id="rId5"/>
     <p:sldId id="260" r:id="rId6"/>
-    <p:sldId id="261" r:id="rId7"/>
-    <p:sldId id="258" r:id="rId8"/>
-    <p:sldId id="263" r:id="rId9"/>
+    <p:sldId id="264" r:id="rId7"/>
+    <p:sldId id="261" r:id="rId8"/>
+    <p:sldId id="258" r:id="rId9"/>
+    <p:sldId id="263" r:id="rId10"/>
   </p:sldIdLst>
   <p:sldSz cx="12192000" cy="6858000"/>
   <p:notesSz cx="6858000" cy="9144000"/>
@@ -114,6 +115,11 @@
       </a:defRPr>
     </a:lvl9pPr>
   </p:defaultTextStyle>
+  <p:extLst>
+    <p:ext uri="{EFAFB233-063F-42B5-8137-9DF3F51BA10A}">
+      <p15:sldGuideLst xmlns:p15="http://schemas.microsoft.com/office/powerpoint/2012/main"/>
+    </p:ext>
+  </p:extLst>
 </p:presentation>
 </file>
 
@@ -199,7 +205,7 @@
           <a:p>
             <a:fld id="{DEED7E69-5927-47A6-8D6F-08C7AA0EF05D}" type="datetimeFigureOut">
               <a:rPr lang="en-US" smtClean="0"/>
-              <a:t>9/6/2016</a:t>
+              <a:t>9/12/2016</a:t>
             </a:fld>
             <a:endParaRPr lang="en-US"/>
           </a:p>
@@ -294,7 +300,6 @@
               <a:rPr lang="en-US"/>
               <a:t>Fifth level</a:t>
             </a:r>
-            <a:endParaRPr lang="en-US"/>
           </a:p>
         </p:txBody>
       </p:sp>
@@ -804,7 +809,6 @@
               <a:rPr lang="en-US"/>
               <a:t>Click to edit Master title style</a:t>
             </a:r>
-            <a:endParaRPr lang="en-US"/>
           </a:p>
         </p:txBody>
       </p:sp>
@@ -869,7 +873,6 @@
               <a:rPr lang="en-US"/>
               <a:t>Click to edit Master subtitle style</a:t>
             </a:r>
-            <a:endParaRPr lang="en-US"/>
           </a:p>
         </p:txBody>
       </p:sp>
@@ -890,7 +893,7 @@
           <a:p>
             <a:fld id="{0016AD54-65BB-4032-9319-93F9170B6828}" type="datetimeFigureOut">
               <a:rPr lang="en-US" smtClean="0"/>
-              <a:t>9/6/2016</a:t>
+              <a:t>9/12/2016</a:t>
             </a:fld>
             <a:endParaRPr lang="en-US"/>
           </a:p>
@@ -987,7 +990,6 @@
               <a:rPr lang="en-US"/>
               <a:t>Click to edit Master title style</a:t>
             </a:r>
-            <a:endParaRPr lang="en-US"/>
           </a:p>
         </p:txBody>
       </p:sp>
@@ -1039,7 +1041,6 @@
               <a:rPr lang="en-US"/>
               <a:t>Fifth level</a:t>
             </a:r>
-            <a:endParaRPr lang="en-US"/>
           </a:p>
         </p:txBody>
       </p:sp>
@@ -1060,7 +1061,7 @@
           <a:p>
             <a:fld id="{0016AD54-65BB-4032-9319-93F9170B6828}" type="datetimeFigureOut">
               <a:rPr lang="en-US" smtClean="0"/>
-              <a:t>9/6/2016</a:t>
+              <a:t>9/12/2016</a:t>
             </a:fld>
             <a:endParaRPr lang="en-US"/>
           </a:p>
@@ -1162,7 +1163,6 @@
               <a:rPr lang="en-US"/>
               <a:t>Click to edit Master title style</a:t>
             </a:r>
-            <a:endParaRPr lang="en-US"/>
           </a:p>
         </p:txBody>
       </p:sp>
@@ -1219,7 +1219,6 @@
               <a:rPr lang="en-US"/>
               <a:t>Fifth level</a:t>
             </a:r>
-            <a:endParaRPr lang="en-US"/>
           </a:p>
         </p:txBody>
       </p:sp>
@@ -1240,7 +1239,7 @@
           <a:p>
             <a:fld id="{0016AD54-65BB-4032-9319-93F9170B6828}" type="datetimeFigureOut">
               <a:rPr lang="en-US" smtClean="0"/>
-              <a:t>9/6/2016</a:t>
+              <a:t>9/12/2016</a:t>
             </a:fld>
             <a:endParaRPr lang="en-US"/>
           </a:p>
@@ -1337,7 +1336,6 @@
               <a:rPr lang="en-US"/>
               <a:t>Click to edit Master title style</a:t>
             </a:r>
-            <a:endParaRPr lang="en-US"/>
           </a:p>
         </p:txBody>
       </p:sp>
@@ -1389,7 +1387,6 @@
               <a:rPr lang="en-US"/>
               <a:t>Fifth level</a:t>
             </a:r>
-            <a:endParaRPr lang="en-US"/>
           </a:p>
         </p:txBody>
       </p:sp>
@@ -1410,7 +1407,7 @@
           <a:p>
             <a:fld id="{0016AD54-65BB-4032-9319-93F9170B6828}" type="datetimeFigureOut">
               <a:rPr lang="en-US" smtClean="0"/>
-              <a:t>9/6/2016</a:t>
+              <a:t>9/12/2016</a:t>
             </a:fld>
             <a:endParaRPr lang="en-US"/>
           </a:p>
@@ -1516,7 +1513,6 @@
               <a:rPr lang="en-US"/>
               <a:t>Click to edit Master title style</a:t>
             </a:r>
-            <a:endParaRPr lang="en-US"/>
           </a:p>
         </p:txBody>
       </p:sp>
@@ -1656,7 +1652,7 @@
           <a:p>
             <a:fld id="{0016AD54-65BB-4032-9319-93F9170B6828}" type="datetimeFigureOut">
               <a:rPr lang="en-US" smtClean="0"/>
-              <a:t>9/6/2016</a:t>
+              <a:t>9/12/2016</a:t>
             </a:fld>
             <a:endParaRPr lang="en-US"/>
           </a:p>
@@ -1753,7 +1749,6 @@
               <a:rPr lang="en-US"/>
               <a:t>Click to edit Master title style</a:t>
             </a:r>
-            <a:endParaRPr lang="en-US"/>
           </a:p>
         </p:txBody>
       </p:sp>
@@ -1810,7 +1805,6 @@
               <a:rPr lang="en-US"/>
               <a:t>Fifth level</a:t>
             </a:r>
-            <a:endParaRPr lang="en-US"/>
           </a:p>
         </p:txBody>
       </p:sp>
@@ -1867,7 +1861,6 @@
               <a:rPr lang="en-US"/>
               <a:t>Fifth level</a:t>
             </a:r>
-            <a:endParaRPr lang="en-US"/>
           </a:p>
         </p:txBody>
       </p:sp>
@@ -1888,7 +1881,7 @@
           <a:p>
             <a:fld id="{0016AD54-65BB-4032-9319-93F9170B6828}" type="datetimeFigureOut">
               <a:rPr lang="en-US" smtClean="0"/>
-              <a:t>9/6/2016</a:t>
+              <a:t>9/12/2016</a:t>
             </a:fld>
             <a:endParaRPr lang="en-US"/>
           </a:p>
@@ -1990,7 +1983,6 @@
               <a:rPr lang="en-US"/>
               <a:t>Click to edit Master title style</a:t>
             </a:r>
-            <a:endParaRPr lang="en-US"/>
           </a:p>
         </p:txBody>
       </p:sp>
@@ -2112,7 +2104,6 @@
               <a:rPr lang="en-US"/>
               <a:t>Fifth level</a:t>
             </a:r>
-            <a:endParaRPr lang="en-US"/>
           </a:p>
         </p:txBody>
       </p:sp>
@@ -2234,7 +2225,6 @@
               <a:rPr lang="en-US"/>
               <a:t>Fifth level</a:t>
             </a:r>
-            <a:endParaRPr lang="en-US"/>
           </a:p>
         </p:txBody>
       </p:sp>
@@ -2255,7 +2245,7 @@
           <a:p>
             <a:fld id="{0016AD54-65BB-4032-9319-93F9170B6828}" type="datetimeFigureOut">
               <a:rPr lang="en-US" smtClean="0"/>
-              <a:t>9/6/2016</a:t>
+              <a:t>9/12/2016</a:t>
             </a:fld>
             <a:endParaRPr lang="en-US"/>
           </a:p>
@@ -2352,7 +2342,6 @@
               <a:rPr lang="en-US"/>
               <a:t>Click to edit Master title style</a:t>
             </a:r>
-            <a:endParaRPr lang="en-US"/>
           </a:p>
         </p:txBody>
       </p:sp>
@@ -2373,7 +2362,7 @@
           <a:p>
             <a:fld id="{0016AD54-65BB-4032-9319-93F9170B6828}" type="datetimeFigureOut">
               <a:rPr lang="en-US" smtClean="0"/>
-              <a:t>9/6/2016</a:t>
+              <a:t>9/12/2016</a:t>
             </a:fld>
             <a:endParaRPr lang="en-US"/>
           </a:p>
@@ -2468,7 +2457,7 @@
           <a:p>
             <a:fld id="{0016AD54-65BB-4032-9319-93F9170B6828}" type="datetimeFigureOut">
               <a:rPr lang="en-US" smtClean="0"/>
-              <a:t>9/6/2016</a:t>
+              <a:t>9/12/2016</a:t>
             </a:fld>
             <a:endParaRPr lang="en-US"/>
           </a:p>
@@ -2574,7 +2563,6 @@
               <a:rPr lang="en-US"/>
               <a:t>Click to edit Master title style</a:t>
             </a:r>
-            <a:endParaRPr lang="en-US"/>
           </a:p>
         </p:txBody>
       </p:sp>
@@ -2659,7 +2647,6 @@
               <a:rPr lang="en-US"/>
               <a:t>Fifth level</a:t>
             </a:r>
-            <a:endParaRPr lang="en-US"/>
           </a:p>
         </p:txBody>
       </p:sp>
@@ -2745,7 +2732,7 @@
           <a:p>
             <a:fld id="{0016AD54-65BB-4032-9319-93F9170B6828}" type="datetimeFigureOut">
               <a:rPr lang="en-US" smtClean="0"/>
-              <a:t>9/6/2016</a:t>
+              <a:t>9/12/2016</a:t>
             </a:fld>
             <a:endParaRPr lang="en-US"/>
           </a:p>
@@ -2851,7 +2838,6 @@
               <a:rPr lang="en-US"/>
               <a:t>Click to edit Master title style</a:t>
             </a:r>
-            <a:endParaRPr lang="en-US"/>
           </a:p>
         </p:txBody>
       </p:sp>
@@ -2998,7 +2984,7 @@
           <a:p>
             <a:fld id="{0016AD54-65BB-4032-9319-93F9170B6828}" type="datetimeFigureOut">
               <a:rPr lang="en-US" smtClean="0"/>
-              <a:t>9/6/2016</a:t>
+              <a:t>9/12/2016</a:t>
             </a:fld>
             <a:endParaRPr lang="en-US"/>
           </a:p>
@@ -3110,7 +3096,6 @@
               <a:rPr lang="en-US"/>
               <a:t>Click to edit Master title style</a:t>
             </a:r>
-            <a:endParaRPr lang="en-US"/>
           </a:p>
         </p:txBody>
       </p:sp>
@@ -3172,7 +3157,6 @@
               <a:rPr lang="en-US"/>
               <a:t>Fifth level</a:t>
             </a:r>
-            <a:endParaRPr lang="en-US"/>
           </a:p>
         </p:txBody>
       </p:sp>
@@ -3211,7 +3195,7 @@
           <a:p>
             <a:fld id="{0016AD54-65BB-4032-9319-93F9170B6828}" type="datetimeFigureOut">
               <a:rPr lang="en-US" smtClean="0"/>
-              <a:t>9/6/2016</a:t>
+              <a:t>9/12/2016</a:t>
             </a:fld>
             <a:endParaRPr lang="en-US"/>
           </a:p>
@@ -4073,7 +4057,7 @@
             <a:spLocks noGrp="1"/>
           </p:cNvSpPr>
           <p:nvPr>
-            <p:ph type="title" idx="4294967295"/>
+            <p:ph type="title"/>
           </p:nvPr>
         </p:nvSpPr>
         <p:spPr/>
@@ -4083,35 +4067,32 @@
           <a:p>
             <a:r>
               <a:rPr lang="en-US" dirty="0"/>
-              <a:t>Adaptive</a:t>
-            </a:r>
-            <a:r>
-              <a:rPr lang="en-US" baseline="0" dirty="0"/>
-              <a:t> UI - ???????</a:t>
-            </a:r>
-            <a:endParaRPr lang="en-US" dirty="0"/>
-          </a:p>
-        </p:txBody>
-      </p:sp>
-      <p:sp>
-        <p:nvSpPr>
-          <p:cNvPr id="3" name="Text Placeholder 2"/>
-          <p:cNvSpPr>
-            <a:spLocks noGrp="1"/>
-          </p:cNvSpPr>
-          <p:nvPr>
-            <p:ph type="body" idx="4294967295"/>
-          </p:nvPr>
-        </p:nvSpPr>
-        <p:spPr/>
-        <p:txBody>
-          <a:bodyPr/>
-          <a:lstStyle/>
-          <a:p>
-            <a:pPr lvl="0"/>
+              <a:t>Adaptive Code</a:t>
+            </a:r>
+          </a:p>
+        </p:txBody>
+      </p:sp>
+      <p:sp>
+        <p:nvSpPr>
+          <p:cNvPr id="3" name="Content Placeholder 2"/>
+          <p:cNvSpPr>
+            <a:spLocks noGrp="1"/>
+          </p:cNvSpPr>
+          <p:nvPr>
+            <p:ph idx="1"/>
+          </p:nvPr>
+        </p:nvSpPr>
+        <p:spPr/>
+        <p:txBody>
+          <a:bodyPr/>
+          <a:lstStyle/>
+          <a:p>
+            <a:pPr marL="0" indent="0">
+              <a:buNone/>
+            </a:pPr>
             <a:r>
               <a:rPr lang="en-US" dirty="0"/>
-              <a:t>????</a:t>
+              <a:t>Most of the Windows Runtime APIs your Universal 8.1 app already calls are implemented in the set of APIs known as the universal device family. But, some are implemented in extension SDKs, and Visual Studio only recognizes APIs that are implemented by your app's target device family or by any extension SDKs that you have referenced.</a:t>
             </a:r>
           </a:p>
         </p:txBody>
@@ -4119,7 +4100,7 @@
     </p:spTree>
     <p:extLst>
       <p:ext uri="{BB962C8B-B14F-4D97-AF65-F5344CB8AC3E}">
-        <p14:creationId xmlns:p14="http://schemas.microsoft.com/office/powerpoint/2010/main" val="4122139464"/>
+        <p14:creationId xmlns:p14="http://schemas.microsoft.com/office/powerpoint/2010/main" val="2995276667"/>
       </p:ext>
     </p:extLst>
   </p:cSld>
@@ -4153,6 +4134,86 @@
             <a:spLocks noGrp="1"/>
           </p:cNvSpPr>
           <p:nvPr>
+            <p:ph type="title" idx="4294967295"/>
+          </p:nvPr>
+        </p:nvSpPr>
+        <p:spPr/>
+        <p:txBody>
+          <a:bodyPr/>
+          <a:lstStyle/>
+          <a:p>
+            <a:r>
+              <a:rPr lang="en-US" dirty="0"/>
+              <a:t>Adaptive</a:t>
+            </a:r>
+            <a:r>
+              <a:rPr lang="en-US" baseline="0" dirty="0"/>
+              <a:t> UI - ???????</a:t>
+            </a:r>
+            <a:endParaRPr lang="en-US" dirty="0"/>
+          </a:p>
+        </p:txBody>
+      </p:sp>
+      <p:sp>
+        <p:nvSpPr>
+          <p:cNvPr id="3" name="Text Placeholder 2"/>
+          <p:cNvSpPr>
+            <a:spLocks noGrp="1"/>
+          </p:cNvSpPr>
+          <p:nvPr>
+            <p:ph type="body" idx="4294967295"/>
+          </p:nvPr>
+        </p:nvSpPr>
+        <p:spPr/>
+        <p:txBody>
+          <a:bodyPr/>
+          <a:lstStyle/>
+          <a:p>
+            <a:pPr lvl="0"/>
+            <a:r>
+              <a:rPr lang="en-US" dirty="0"/>
+              <a:t>????</a:t>
+            </a:r>
+          </a:p>
+        </p:txBody>
+      </p:sp>
+    </p:spTree>
+    <p:extLst>
+      <p:ext uri="{BB962C8B-B14F-4D97-AF65-F5344CB8AC3E}">
+        <p14:creationId xmlns:p14="http://schemas.microsoft.com/office/powerpoint/2010/main" val="4122139464"/>
+      </p:ext>
+    </p:extLst>
+  </p:cSld>
+  <p:clrMapOvr>
+    <a:masterClrMapping/>
+  </p:clrMapOvr>
+</p:sld>
+</file>
+
+<file path=ppt/slides/slide8.xml><?xml version="1.0" encoding="utf-8"?>
+<p:sld xmlns:a="http://schemas.openxmlformats.org/drawingml/2006/main" xmlns:r="http://schemas.openxmlformats.org/officeDocument/2006/relationships" xmlns:p="http://schemas.openxmlformats.org/presentationml/2006/main">
+  <p:cSld>
+    <p:spTree>
+      <p:nvGrpSpPr>
+        <p:cNvPr id="1" name=""/>
+        <p:cNvGrpSpPr/>
+        <p:nvPr/>
+      </p:nvGrpSpPr>
+      <p:grpSpPr>
+        <a:xfrm>
+          <a:off x="0" y="0"/>
+          <a:ext cx="0" cy="0"/>
+          <a:chOff x="0" y="0"/>
+          <a:chExt cx="0" cy="0"/>
+        </a:xfrm>
+      </p:grpSpPr>
+      <p:sp>
+        <p:nvSpPr>
+          <p:cNvPr id="2" name="Title 1"/>
+          <p:cNvSpPr>
+            <a:spLocks noGrp="1"/>
+          </p:cNvSpPr>
+          <p:nvPr>
             <p:ph type="title"/>
           </p:nvPr>
         </p:nvSpPr>
@@ -4229,7 +4290,7 @@
 </p:sld>
 </file>
 
-<file path=ppt/slides/slide8.xml><?xml version="1.0" encoding="utf-8"?>
+<file path=ppt/slides/slide9.xml><?xml version="1.0" encoding="utf-8"?>
 <p:sld xmlns:a="http://schemas.openxmlformats.org/drawingml/2006/main" xmlns:r="http://schemas.openxmlformats.org/officeDocument/2006/relationships" xmlns:p="http://schemas.openxmlformats.org/presentationml/2006/main">
   <p:cSld>
     <p:spTree>

</xml_diff>